<commit_message>
Removed the duplicate slide
</commit_message>
<xml_diff>
--- a/testing/Introduction to unit testing.pptx
+++ b/testing/Introduction to unit testing.pptx
@@ -5,10 +5,10 @@
     <p:sldMasterId id="2147483648" r:id="rId1"/>
   </p:sldMasterIdLst>
   <p:notesMasterIdLst>
-    <p:notesMasterId r:id="rId24"/>
+    <p:notesMasterId r:id="rId23"/>
   </p:notesMasterIdLst>
   <p:handoutMasterIdLst>
-    <p:handoutMasterId r:id="rId25"/>
+    <p:handoutMasterId r:id="rId24"/>
   </p:handoutMasterIdLst>
   <p:sldIdLst>
     <p:sldId id="256" r:id="rId2"/>
@@ -28,29 +28,28 @@
     <p:sldId id="275" r:id="rId16"/>
     <p:sldId id="276" r:id="rId17"/>
     <p:sldId id="277" r:id="rId18"/>
-    <p:sldId id="278" r:id="rId19"/>
-    <p:sldId id="279" r:id="rId20"/>
-    <p:sldId id="280" r:id="rId21"/>
-    <p:sldId id="259" r:id="rId22"/>
-    <p:sldId id="281" r:id="rId23"/>
+    <p:sldId id="279" r:id="rId19"/>
+    <p:sldId id="280" r:id="rId20"/>
+    <p:sldId id="259" r:id="rId21"/>
+    <p:sldId id="281" r:id="rId22"/>
   </p:sldIdLst>
   <p:sldSz cx="9144000" cy="6858000" type="screen4x3"/>
   <p:notesSz cx="6858000" cy="9144000"/>
   <p:embeddedFontLst>
     <p:embeddedFont>
-      <p:font typeface="AA Zuehlke" panose="02000503060000020004" pitchFamily="2" charset="0"/>
-      <p:regular r:id="rId26"/>
-      <p:bold r:id="rId27"/>
-      <p:italic r:id="rId28"/>
+      <p:font typeface="AA Zuehlke Medium" panose="02000603060000020004" pitchFamily="2" charset="0"/>
+      <p:regular r:id="rId25"/>
+      <p:italic r:id="rId26"/>
     </p:embeddedFont>
     <p:embeddedFont>
-      <p:font typeface="AA Zuehlke Medium" panose="02000603060000020004" pitchFamily="2" charset="0"/>
-      <p:regular r:id="rId29"/>
-      <p:italic r:id="rId30"/>
+      <p:font typeface="AA Zuehlke" panose="02000503060000020004" pitchFamily="2" charset="0"/>
+      <p:regular r:id="rId27"/>
+      <p:bold r:id="rId28"/>
+      <p:italic r:id="rId29"/>
     </p:embeddedFont>
   </p:embeddedFontLst>
   <p:custDataLst>
-    <p:tags r:id="rId31"/>
+    <p:tags r:id="rId30"/>
   </p:custDataLst>
   <p:defaultTextStyle>
     <a:defPPr>
@@ -266,7 +265,7 @@
               <a:rPr lang="de-DE" smtClean="0">
                 <a:latin typeface="AA Zuehlke" pitchFamily="2" charset="0"/>
               </a:rPr>
-              <a:t>04.10.2016</a:t>
+              <a:t>24.11.2016</a:t>
             </a:fld>
             <a:endParaRPr lang="de-DE">
               <a:latin typeface="AA Zuehlke" pitchFamily="2" charset="0"/>
@@ -444,7 +443,7 @@
             <a:fld id="{A6966AE6-B72D-4967-9CA3-8469D2863705}" type="datetimeFigureOut">
               <a:rPr lang="en-US" smtClean="0"/>
               <a:pPr/>
-              <a:t>10/4/2016</a:t>
+              <a:t>11/24/2016</a:t>
             </a:fld>
             <a:endParaRPr lang="en-US" dirty="0"/>
           </a:p>
@@ -1218,7 +1217,7 @@
             <a:fld id="{04E102C5-3B9C-48EE-BFF0-2E7AF2F2A1F4}" type="slidenum">
               <a:rPr lang="en-US" smtClean="0"/>
               <a:pPr/>
-              <a:t>20</a:t>
+              <a:t>19</a:t>
             </a:fld>
             <a:endParaRPr lang="en-US" dirty="0"/>
           </a:p>
@@ -1303,7 +1302,7 @@
             <a:fld id="{04E102C5-3B9C-48EE-BFF0-2E7AF2F2A1F4}" type="slidenum">
               <a:rPr lang="en-US" smtClean="0"/>
               <a:pPr/>
-              <a:t>21</a:t>
+              <a:t>20</a:t>
             </a:fld>
             <a:endParaRPr lang="en-US" dirty="0"/>
           </a:p>
@@ -8785,12 +8784,12 @@
       </p:grpSpPr>
       <p:sp>
         <p:nvSpPr>
-          <p:cNvPr id="2" name="Content Placeholder 1"/>
-          <p:cNvSpPr>
-            <a:spLocks noGrp="1"/>
-          </p:cNvSpPr>
-          <p:nvPr>
-            <p:ph idx="1"/>
+          <p:cNvPr id="2" name="Title 1"/>
+          <p:cNvSpPr>
+            <a:spLocks noGrp="1"/>
+          </p:cNvSpPr>
+          <p:nvPr>
+            <p:ph type="ctrTitle"/>
           </p:nvPr>
         </p:nvSpPr>
         <p:spPr/>
@@ -8798,106 +8797,22 @@
           <a:bodyPr/>
           <a:lstStyle/>
           <a:p>
-            <a:pPr marL="342900" indent="-342900">
-              <a:buFont typeface="Arial" panose="020B0604020202020204" pitchFamily="34" charset="0"/>
-              <a:buChar char="•"/>
-            </a:pPr>
-            <a:r>
-              <a:rPr lang="en-PH" dirty="0"/>
-              <a:t>Test public API</a:t>
-            </a:r>
-          </a:p>
-          <a:p>
-            <a:pPr lvl="2">
-              <a:buFont typeface="Arial" panose="020B0604020202020204" pitchFamily="34" charset="0"/>
-              <a:buChar char="•"/>
-            </a:pPr>
-            <a:r>
-              <a:rPr lang="en-PH" dirty="0"/>
-              <a:t>Unit testing can be defined as </a:t>
-            </a:r>
-            <a:r>
-              <a:rPr lang="en-PH" i="1" dirty="0"/>
-              <a:t>testing classes through their public API</a:t>
-            </a:r>
-            <a:r>
-              <a:rPr lang="en-PH" dirty="0"/>
-              <a:t>. Some testing tools makes it possible to test private content of a class, but this should be avoided as it makes the test more verbose and much harder to maintain. If there is private content that seems to need explicit testing, consider refactoring it into public methods in utility classes instead. But do this to improve the general design, not to aid testing</a:t>
-            </a:r>
-            <a:r>
-              <a:rPr lang="en-PH" dirty="0" smtClean="0"/>
-              <a:t>.</a:t>
-            </a:r>
-            <a:endParaRPr lang="en-PH" dirty="0"/>
-          </a:p>
-          <a:p>
-            <a:pPr marL="342900" indent="-342900">
-              <a:buFont typeface="Arial" panose="020B0604020202020204" pitchFamily="34" charset="0"/>
-              <a:buChar char="•"/>
-            </a:pPr>
-            <a:r>
-              <a:rPr lang="en-PH" dirty="0"/>
-              <a:t>Provide negative tests</a:t>
-            </a:r>
-          </a:p>
-          <a:p>
-            <a:pPr lvl="2">
-              <a:buFont typeface="Arial" panose="020B0604020202020204" pitchFamily="34" charset="0"/>
-              <a:buChar char="•"/>
-            </a:pPr>
-            <a:r>
-              <a:rPr lang="en-PH" dirty="0"/>
-              <a:t>Negative tests intentionally misuse the code and verify robustness and appropriate error handling</a:t>
-            </a:r>
-            <a:r>
-              <a:rPr lang="en-PH" dirty="0" smtClean="0"/>
-              <a:t>.</a:t>
-            </a:r>
-            <a:endParaRPr lang="en-PH" dirty="0"/>
-          </a:p>
-          <a:p>
-            <a:pPr marL="342900" indent="-342900">
-              <a:buFont typeface="Arial" panose="020B0604020202020204" pitchFamily="34" charset="0"/>
-              <a:buChar char="•"/>
-            </a:pPr>
-            <a:r>
-              <a:rPr lang="en-PH" dirty="0"/>
-              <a:t>Design code with testing in mind</a:t>
-            </a:r>
-          </a:p>
-          <a:p>
-            <a:pPr lvl="2">
-              <a:buFont typeface="Arial" panose="020B0604020202020204" pitchFamily="34" charset="0"/>
-              <a:buChar char="•"/>
-            </a:pPr>
-            <a:r>
-              <a:rPr lang="en-PH" dirty="0"/>
-              <a:t>Writing and maintaining unit tests are costly, and minimizing public API and reducing </a:t>
-            </a:r>
-            <a:r>
-              <a:rPr lang="en-PH" dirty="0" smtClean="0"/>
-              <a:t>complexity </a:t>
-            </a:r>
-            <a:r>
-              <a:rPr lang="en-PH" dirty="0"/>
-              <a:t>in the code are ways to reduce this cost and make high-coverage test code faster to write and easier to maintain</a:t>
-            </a:r>
-            <a:r>
-              <a:rPr lang="en-PH" dirty="0" smtClean="0"/>
-              <a:t>.</a:t>
-            </a:r>
-            <a:endParaRPr lang="en-PH" dirty="0"/>
-          </a:p>
-        </p:txBody>
-      </p:sp>
-      <p:sp>
-        <p:nvSpPr>
-          <p:cNvPr id="3" name="Title 2"/>
-          <p:cNvSpPr>
-            <a:spLocks noGrp="1"/>
-          </p:cNvSpPr>
-          <p:nvPr>
-            <p:ph type="title"/>
+            <a:r>
+              <a:rPr lang="en-GB" dirty="0" smtClean="0"/>
+              <a:t>Test Driven Development</a:t>
+            </a:r>
+            <a:endParaRPr lang="en-GB" dirty="0"/>
+          </a:p>
+        </p:txBody>
+      </p:sp>
+      <p:sp>
+        <p:nvSpPr>
+          <p:cNvPr id="3" name="Subtitle 2"/>
+          <p:cNvSpPr>
+            <a:spLocks noGrp="1"/>
+          </p:cNvSpPr>
+          <p:nvPr>
+            <p:ph type="subTitle" idx="1"/>
           </p:nvPr>
         </p:nvSpPr>
         <p:spPr/>
@@ -8905,22 +8820,18 @@
           <a:bodyPr/>
           <a:lstStyle/>
           <a:p>
-            <a:r>
-              <a:rPr lang="en-GB" dirty="0" smtClean="0"/>
-              <a:t>Guidelines</a:t>
-            </a:r>
             <a:endParaRPr lang="en-GB" dirty="0"/>
           </a:p>
         </p:txBody>
       </p:sp>
       <p:sp>
         <p:nvSpPr>
-          <p:cNvPr id="8" name="Footer Placeholder 7"/>
-          <p:cNvSpPr>
-            <a:spLocks noGrp="1"/>
-          </p:cNvSpPr>
-          <p:nvPr>
-            <p:ph type="ftr" sz="quarter" idx="11"/>
+          <p:cNvPr id="7" name="Date Placeholder 6"/>
+          <p:cNvSpPr>
+            <a:spLocks noGrp="1"/>
+          </p:cNvSpPr>
+          <p:nvPr>
+            <p:ph type="dt" sz="half" idx="10"/>
           </p:nvPr>
         </p:nvSpPr>
         <p:spPr/>
@@ -8930,7 +8841,7 @@
           <a:p>
             <a:r>
               <a:rPr lang="de-CH" smtClean="0"/>
-              <a:t>Unit Testing | Miloš Andrejić</a:t>
+              <a:t>3. March 2014</a:t>
             </a:r>
             <a:endParaRPr lang="de-CH" dirty="0"/>
           </a:p>
@@ -8938,30 +8849,7 @@
       </p:sp>
       <p:sp>
         <p:nvSpPr>
-          <p:cNvPr id="9" name="Date Placeholder 8"/>
-          <p:cNvSpPr>
-            <a:spLocks noGrp="1"/>
-          </p:cNvSpPr>
-          <p:nvPr>
-            <p:ph type="dt" sz="half" idx="10"/>
-          </p:nvPr>
-        </p:nvSpPr>
-        <p:spPr/>
-        <p:txBody>
-          <a:bodyPr/>
-          <a:lstStyle/>
-          <a:p>
-            <a:r>
-              <a:rPr lang="en-US" smtClean="0"/>
-              <a:t>3. March 2014</a:t>
-            </a:r>
-            <a:endParaRPr lang="de-CH" dirty="0"/>
-          </a:p>
-        </p:txBody>
-      </p:sp>
-      <p:sp>
-        <p:nvSpPr>
-          <p:cNvPr id="5" name="Slide Number Placeholder 4"/>
+          <p:cNvPr id="4" name="Slide Number Placeholder 3"/>
           <p:cNvSpPr>
             <a:spLocks noGrp="1"/>
           </p:cNvSpPr>
@@ -8978,7 +8866,7 @@
               <a:rPr lang="de-CH" smtClean="0"/>
               <a:t>Slide </a:t>
             </a:r>
-            <a:fld id="{3F1993F0-36F9-4099-8132-DA7E4BD2FD25}" type="slidenum">
+            <a:fld id="{E37D6AFA-B3CB-49D5-91CD-D5AB386F431E}" type="slidenum">
               <a:rPr lang="de-CH" smtClean="0"/>
               <a:t>18</a:t>
             </a:fld>
@@ -8989,7 +8877,7 @@
     </p:spTree>
     <p:extLst>
       <p:ext uri="{BB962C8B-B14F-4D97-AF65-F5344CB8AC3E}">
-        <p14:creationId xmlns:p14="http://schemas.microsoft.com/office/powerpoint/2010/main" val="1764723653"/>
+        <p14:creationId xmlns:p14="http://schemas.microsoft.com/office/powerpoint/2010/main" val="3817192384"/>
       </p:ext>
     </p:extLst>
   </p:cSld>
@@ -9023,14 +8911,43 @@
           <a:chExt cx="0" cy="0"/>
         </a:xfrm>
       </p:grpSpPr>
-      <p:sp>
-        <p:nvSpPr>
-          <p:cNvPr id="2" name="Title 1"/>
-          <p:cNvSpPr>
-            <a:spLocks noGrp="1"/>
-          </p:cNvSpPr>
-          <p:nvPr>
-            <p:ph type="ctrTitle"/>
+      <p:pic>
+        <p:nvPicPr>
+          <p:cNvPr id="6" name="Content Placeholder 5"/>
+          <p:cNvPicPr>
+            <a:picLocks noGrp="1" noChangeAspect="1"/>
+          </p:cNvPicPr>
+          <p:nvPr>
+            <p:ph idx="1"/>
+          </p:nvPr>
+        </p:nvPicPr>
+        <p:blipFill>
+          <a:blip r:embed="rId3">
+            <a:extLst>
+              <a:ext uri="{28A0092B-C50C-407E-A947-70E740481C1C}">
+                <a14:useLocalDpi xmlns:a14="http://schemas.microsoft.com/office/drawing/2010/main" val="0"/>
+              </a:ext>
+            </a:extLst>
+          </a:blip>
+          <a:stretch>
+            <a:fillRect/>
+          </a:stretch>
+        </p:blipFill>
+        <p:spPr>
+          <a:xfrm>
+            <a:off x="677862" y="1736725"/>
+            <a:ext cx="6505575" cy="4667250"/>
+          </a:xfrm>
+        </p:spPr>
+      </p:pic>
+      <p:sp>
+        <p:nvSpPr>
+          <p:cNvPr id="3" name="Title 2"/>
+          <p:cNvSpPr>
+            <a:spLocks noGrp="1"/>
+          </p:cNvSpPr>
+          <p:nvPr>
+            <p:ph type="title"/>
           </p:nvPr>
         </p:nvSpPr>
         <p:spPr/>
@@ -9048,12 +8965,12 @@
       </p:sp>
       <p:sp>
         <p:nvSpPr>
-          <p:cNvPr id="3" name="Subtitle 2"/>
-          <p:cNvSpPr>
-            <a:spLocks noGrp="1"/>
-          </p:cNvSpPr>
-          <p:nvPr>
-            <p:ph type="subTitle" idx="1"/>
+          <p:cNvPr id="8" name="Footer Placeholder 7"/>
+          <p:cNvSpPr>
+            <a:spLocks noGrp="1"/>
+          </p:cNvSpPr>
+          <p:nvPr>
+            <p:ph type="ftr" sz="quarter" idx="11"/>
           </p:nvPr>
         </p:nvSpPr>
         <p:spPr/>
@@ -9061,13 +8978,17 @@
           <a:bodyPr/>
           <a:lstStyle/>
           <a:p>
-            <a:endParaRPr lang="en-GB" dirty="0"/>
-          </a:p>
-        </p:txBody>
-      </p:sp>
-      <p:sp>
-        <p:nvSpPr>
-          <p:cNvPr id="7" name="Date Placeholder 6"/>
+            <a:r>
+              <a:rPr lang="de-CH" smtClean="0"/>
+              <a:t>Unit Testing | Miloš Andrejić</a:t>
+            </a:r>
+            <a:endParaRPr lang="de-CH" dirty="0"/>
+          </a:p>
+        </p:txBody>
+      </p:sp>
+      <p:sp>
+        <p:nvSpPr>
+          <p:cNvPr id="9" name="Date Placeholder 8"/>
           <p:cNvSpPr>
             <a:spLocks noGrp="1"/>
           </p:cNvSpPr>
@@ -9081,7 +9002,7 @@
           <a:lstStyle/>
           <a:p>
             <a:r>
-              <a:rPr lang="de-CH" smtClean="0"/>
+              <a:rPr lang="en-US" smtClean="0"/>
               <a:t>3. March 2014</a:t>
             </a:r>
             <a:endParaRPr lang="de-CH" dirty="0"/>
@@ -9107,7 +9028,7 @@
               <a:rPr lang="de-CH" smtClean="0"/>
               <a:t>Slide </a:t>
             </a:r>
-            <a:fld id="{E37D6AFA-B3CB-49D5-91CD-D5AB386F431E}" type="slidenum">
+            <a:fld id="{3F1993F0-36F9-4099-8132-DA7E4BD2FD25}" type="slidenum">
               <a:rPr lang="de-CH" smtClean="0"/>
               <a:t>19</a:t>
             </a:fld>
@@ -9118,7 +9039,7 @@
     </p:spTree>
     <p:extLst>
       <p:ext uri="{BB962C8B-B14F-4D97-AF65-F5344CB8AC3E}">
-        <p14:creationId xmlns:p14="http://schemas.microsoft.com/office/powerpoint/2010/main" val="3817192384"/>
+        <p14:creationId xmlns:p14="http://schemas.microsoft.com/office/powerpoint/2010/main" val="1777598070"/>
       </p:ext>
     </p:extLst>
   </p:cSld>
@@ -9314,35 +9235,113 @@
           <a:chExt cx="0" cy="0"/>
         </a:xfrm>
       </p:grpSpPr>
-      <p:pic>
-        <p:nvPicPr>
-          <p:cNvPr id="6" name="Content Placeholder 5"/>
-          <p:cNvPicPr>
-            <a:picLocks noGrp="1" noChangeAspect="1"/>
-          </p:cNvPicPr>
+      <p:sp>
+        <p:nvSpPr>
+          <p:cNvPr id="2" name="Content Placeholder 1"/>
+          <p:cNvSpPr>
+            <a:spLocks noGrp="1"/>
+          </p:cNvSpPr>
           <p:nvPr>
             <p:ph idx="1"/>
           </p:nvPr>
-        </p:nvPicPr>
-        <p:blipFill>
-          <a:blip r:embed="rId3">
-            <a:extLst>
-              <a:ext uri="{28A0092B-C50C-407E-A947-70E740481C1C}">
-                <a14:useLocalDpi xmlns:a14="http://schemas.microsoft.com/office/drawing/2010/main" val="0"/>
-              </a:ext>
-            </a:extLst>
-          </a:blip>
-          <a:stretch>
-            <a:fillRect/>
-          </a:stretch>
-        </p:blipFill>
-        <p:spPr>
-          <a:xfrm>
-            <a:off x="677862" y="1736725"/>
-            <a:ext cx="6505575" cy="4667250"/>
-          </a:xfrm>
-        </p:spPr>
-      </p:pic>
+        </p:nvSpPr>
+        <p:spPr/>
+        <p:txBody>
+          <a:bodyPr/>
+          <a:lstStyle/>
+          <a:p>
+            <a:pPr marL="342900" indent="-342900">
+              <a:buFont typeface="Arial" panose="020B0604020202020204" pitchFamily="34" charset="0"/>
+              <a:buChar char="•"/>
+            </a:pPr>
+            <a:r>
+              <a:rPr lang="en-GB" dirty="0" smtClean="0"/>
+              <a:t>Test encourage better design sooner</a:t>
+            </a:r>
+          </a:p>
+          <a:p>
+            <a:pPr marL="342900" indent="-342900">
+              <a:buFont typeface="Arial" panose="020B0604020202020204" pitchFamily="34" charset="0"/>
+              <a:buChar char="•"/>
+            </a:pPr>
+            <a:r>
+              <a:rPr lang="en-GB" dirty="0" smtClean="0"/>
+              <a:t>Tests are the best documentation</a:t>
+            </a:r>
+          </a:p>
+          <a:p>
+            <a:pPr marL="342900" indent="-342900">
+              <a:buFont typeface="Arial" panose="020B0604020202020204" pitchFamily="34" charset="0"/>
+              <a:buChar char="•"/>
+            </a:pPr>
+            <a:r>
+              <a:rPr lang="en-GB" dirty="0" smtClean="0"/>
+              <a:t>Tests are your safety net</a:t>
+            </a:r>
+          </a:p>
+          <a:p>
+            <a:pPr marL="608013" lvl="1" indent="-342900">
+              <a:buFont typeface="Arial" panose="020B0604020202020204" pitchFamily="34" charset="0"/>
+              <a:buChar char="•"/>
+            </a:pPr>
+            <a:r>
+              <a:rPr lang="en-GB" dirty="0" smtClean="0"/>
+              <a:t>Every day use (immediate feedback)</a:t>
+            </a:r>
+          </a:p>
+          <a:p>
+            <a:pPr marL="608013" lvl="1" indent="-342900">
+              <a:buFont typeface="Arial" panose="020B0604020202020204" pitchFamily="34" charset="0"/>
+              <a:buChar char="•"/>
+            </a:pPr>
+            <a:r>
+              <a:rPr lang="en-GB" dirty="0" smtClean="0"/>
+              <a:t>Major refactoring freedom</a:t>
+            </a:r>
+          </a:p>
+          <a:p>
+            <a:pPr marL="342900" indent="-342900">
+              <a:buFont typeface="Arial" panose="020B0604020202020204" pitchFamily="34" charset="0"/>
+              <a:buChar char="•"/>
+            </a:pPr>
+            <a:r>
+              <a:rPr lang="en-GB" dirty="0" smtClean="0">
+                <a:solidFill>
+                  <a:srgbClr val="FF0000"/>
+                </a:solidFill>
+              </a:rPr>
+              <a:t>Increase in development time (15 - 35%)</a:t>
+            </a:r>
+          </a:p>
+          <a:p>
+            <a:pPr marL="342900" indent="-342900">
+              <a:buFont typeface="Arial" panose="020B0604020202020204" pitchFamily="34" charset="0"/>
+              <a:buChar char="•"/>
+            </a:pPr>
+            <a:r>
+              <a:rPr lang="en-GB" dirty="0" smtClean="0">
+                <a:solidFill>
+                  <a:srgbClr val="00B050"/>
+                </a:solidFill>
+              </a:rPr>
+              <a:t>Decrease in pre-release defects (40 - 90%) </a:t>
+            </a:r>
+          </a:p>
+          <a:p>
+            <a:pPr marL="0" lvl="1" indent="0">
+              <a:buNone/>
+            </a:pPr>
+            <a:r>
+              <a:rPr lang="en-GB" sz="1000" dirty="0" smtClean="0"/>
+              <a:t>(source </a:t>
+            </a:r>
+            <a:r>
+              <a:rPr lang="en-GB" sz="1000" dirty="0"/>
+              <a:t>NCSU http://collaboration.csc.ncsu.edu/laurie/Papers/TDDpaperv8.pdf, Microsoft http://research.microsoft.com/en-us/groups/ese/nagappan_tdd.pdf)</a:t>
+            </a:r>
+          </a:p>
+        </p:txBody>
+      </p:sp>
       <p:sp>
         <p:nvSpPr>
           <p:cNvPr id="3" name="Title 2"/>
@@ -9360,7 +9359,7 @@
           <a:p>
             <a:r>
               <a:rPr lang="en-GB" dirty="0" smtClean="0"/>
-              <a:t>Test Driven Development</a:t>
+              <a:t>Technical Reasons for TDD</a:t>
             </a:r>
             <a:endParaRPr lang="en-GB" dirty="0"/>
           </a:p>
@@ -9414,7 +9413,7 @@
       </p:sp>
       <p:sp>
         <p:nvSpPr>
-          <p:cNvPr id="4" name="Slide Number Placeholder 3"/>
+          <p:cNvPr id="11" name="Slide Number Placeholder 10"/>
           <p:cNvSpPr>
             <a:spLocks noGrp="1"/>
           </p:cNvSpPr>
@@ -9442,7 +9441,7 @@
     </p:spTree>
     <p:extLst>
       <p:ext uri="{BB962C8B-B14F-4D97-AF65-F5344CB8AC3E}">
-        <p14:creationId xmlns:p14="http://schemas.microsoft.com/office/powerpoint/2010/main" val="1777598070"/>
+        <p14:creationId xmlns:p14="http://schemas.microsoft.com/office/powerpoint/2010/main" val="248274490"/>
       </p:ext>
     </p:extLst>
   </p:cSld>
@@ -9478,12 +9477,12 @@
       </p:grpSpPr>
       <p:sp>
         <p:nvSpPr>
-          <p:cNvPr id="2" name="Content Placeholder 1"/>
-          <p:cNvSpPr>
-            <a:spLocks noGrp="1"/>
-          </p:cNvSpPr>
-          <p:nvPr>
-            <p:ph idx="1"/>
+          <p:cNvPr id="2" name="Title 1"/>
+          <p:cNvSpPr>
+            <a:spLocks noGrp="1"/>
+          </p:cNvSpPr>
+          <p:nvPr>
+            <p:ph type="ctrTitle"/>
           </p:nvPr>
         </p:nvSpPr>
         <p:spPr/>
@@ -9491,106 +9490,45 @@
           <a:bodyPr/>
           <a:lstStyle/>
           <a:p>
-            <a:pPr marL="342900" indent="-342900">
-              <a:buFont typeface="Arial" panose="020B0604020202020204" pitchFamily="34" charset="0"/>
-              <a:buChar char="•"/>
-            </a:pPr>
             <a:r>
               <a:rPr lang="en-GB" dirty="0" smtClean="0"/>
-              <a:t>Test encourage better design sooner</a:t>
-            </a:r>
-          </a:p>
-          <a:p>
-            <a:pPr marL="342900" indent="-342900">
-              <a:buFont typeface="Arial" panose="020B0604020202020204" pitchFamily="34" charset="0"/>
-              <a:buChar char="•"/>
-            </a:pPr>
+              <a:t>TDD Example</a:t>
+            </a:r>
+            <a:endParaRPr lang="en-GB" dirty="0"/>
+          </a:p>
+        </p:txBody>
+      </p:sp>
+      <p:sp>
+        <p:nvSpPr>
+          <p:cNvPr id="3" name="Subtitle 2"/>
+          <p:cNvSpPr>
+            <a:spLocks noGrp="1"/>
+          </p:cNvSpPr>
+          <p:nvPr>
+            <p:ph type="subTitle" idx="1"/>
+          </p:nvPr>
+        </p:nvSpPr>
+        <p:spPr/>
+        <p:txBody>
+          <a:bodyPr/>
+          <a:lstStyle/>
+          <a:p>
             <a:r>
               <a:rPr lang="en-GB" dirty="0" smtClean="0"/>
-              <a:t>Tests are the best documentation</a:t>
-            </a:r>
-          </a:p>
-          <a:p>
-            <a:pPr marL="342900" indent="-342900">
-              <a:buFont typeface="Arial" panose="020B0604020202020204" pitchFamily="34" charset="0"/>
-              <a:buChar char="•"/>
-            </a:pPr>
-            <a:r>
-              <a:rPr lang="en-GB" dirty="0" smtClean="0"/>
-              <a:t>Tests are your safety net</a:t>
-            </a:r>
-          </a:p>
-          <a:p>
-            <a:pPr marL="608013" lvl="1" indent="-342900">
-              <a:buFont typeface="Arial" panose="020B0604020202020204" pitchFamily="34" charset="0"/>
-              <a:buChar char="•"/>
-            </a:pPr>
-            <a:r>
-              <a:rPr lang="en-GB" dirty="0" smtClean="0"/>
-              <a:t>Every day use (immediate feedback)</a:t>
-            </a:r>
-          </a:p>
-          <a:p>
-            <a:pPr marL="608013" lvl="1" indent="-342900">
-              <a:buFont typeface="Arial" panose="020B0604020202020204" pitchFamily="34" charset="0"/>
-              <a:buChar char="•"/>
-            </a:pPr>
-            <a:r>
-              <a:rPr lang="en-GB" dirty="0" smtClean="0"/>
-              <a:t>Major refactoring freedom</a:t>
-            </a:r>
-          </a:p>
-          <a:p>
-            <a:pPr marL="342900" indent="-342900">
-              <a:buFont typeface="Arial" panose="020B0604020202020204" pitchFamily="34" charset="0"/>
-              <a:buChar char="•"/>
-            </a:pPr>
-            <a:r>
-              <a:rPr lang="en-GB" dirty="0" smtClean="0">
-                <a:solidFill>
-                  <a:srgbClr val="FF0000"/>
-                </a:solidFill>
-              </a:rPr>
-              <a:t>Increase in development time (15 - 35%)</a:t>
-            </a:r>
-          </a:p>
-          <a:p>
-            <a:pPr marL="342900" indent="-342900">
-              <a:buFont typeface="Arial" panose="020B0604020202020204" pitchFamily="34" charset="0"/>
-              <a:buChar char="•"/>
-            </a:pPr>
-            <a:r>
-              <a:rPr lang="en-GB" dirty="0" smtClean="0">
-                <a:solidFill>
-                  <a:srgbClr val="00B050"/>
-                </a:solidFill>
-              </a:rPr>
-              <a:t>Decrease in pre-release defects (40 - 90%) </a:t>
-            </a:r>
-          </a:p>
-          <a:p>
-            <a:pPr marL="0" lvl="1" indent="0">
-              <a:buNone/>
-            </a:pPr>
-            <a:r>
-              <a:rPr lang="en-GB" sz="1000" dirty="0" smtClean="0"/>
-              <a:t>(source </a:t>
-            </a:r>
-            <a:r>
-              <a:rPr lang="en-GB" sz="1000" dirty="0"/>
-              <a:t>NCSU http://collaboration.csc.ncsu.edu/laurie/Papers/TDDpaperv8.pdf, Microsoft http://research.microsoft.com/en-us/groups/ese/nagappan_tdd.pdf)</a:t>
-            </a:r>
-          </a:p>
-        </p:txBody>
-      </p:sp>
-      <p:sp>
-        <p:nvSpPr>
-          <p:cNvPr id="3" name="Title 2"/>
-          <p:cNvSpPr>
-            <a:spLocks noGrp="1"/>
-          </p:cNvSpPr>
-          <p:nvPr>
-            <p:ph type="title"/>
+              <a:t>Showcase</a:t>
+            </a:r>
+            <a:endParaRPr lang="en-GB" dirty="0"/>
+          </a:p>
+        </p:txBody>
+      </p:sp>
+      <p:sp>
+        <p:nvSpPr>
+          <p:cNvPr id="7" name="Date Placeholder 6"/>
+          <p:cNvSpPr>
+            <a:spLocks noGrp="1"/>
+          </p:cNvSpPr>
+          <p:nvPr>
+            <p:ph type="dt" sz="half" idx="10"/>
           </p:nvPr>
         </p:nvSpPr>
         <p:spPr/>
@@ -9599,31 +9537,8 @@
           <a:lstStyle/>
           <a:p>
             <a:r>
-              <a:rPr lang="en-GB" dirty="0" smtClean="0"/>
-              <a:t>Technical Reasons for TDD</a:t>
-            </a:r>
-            <a:endParaRPr lang="en-GB" dirty="0"/>
-          </a:p>
-        </p:txBody>
-      </p:sp>
-      <p:sp>
-        <p:nvSpPr>
-          <p:cNvPr id="8" name="Footer Placeholder 7"/>
-          <p:cNvSpPr>
-            <a:spLocks noGrp="1"/>
-          </p:cNvSpPr>
-          <p:nvPr>
-            <p:ph type="ftr" sz="quarter" idx="11"/>
-          </p:nvPr>
-        </p:nvSpPr>
-        <p:spPr/>
-        <p:txBody>
-          <a:bodyPr/>
-          <a:lstStyle/>
-          <a:p>
-            <a:r>
               <a:rPr lang="de-CH" smtClean="0"/>
-              <a:t>Unit Testing | Miloš Andrejić</a:t>
+              <a:t>3. March 2014</a:t>
             </a:r>
             <a:endParaRPr lang="de-CH" dirty="0"/>
           </a:p>
@@ -9631,30 +9546,7 @@
       </p:sp>
       <p:sp>
         <p:nvSpPr>
-          <p:cNvPr id="9" name="Date Placeholder 8"/>
-          <p:cNvSpPr>
-            <a:spLocks noGrp="1"/>
-          </p:cNvSpPr>
-          <p:nvPr>
-            <p:ph type="dt" sz="half" idx="10"/>
-          </p:nvPr>
-        </p:nvSpPr>
-        <p:spPr/>
-        <p:txBody>
-          <a:bodyPr/>
-          <a:lstStyle/>
-          <a:p>
-            <a:r>
-              <a:rPr lang="en-US" smtClean="0"/>
-              <a:t>3. March 2014</a:t>
-            </a:r>
-            <a:endParaRPr lang="de-CH" dirty="0"/>
-          </a:p>
-        </p:txBody>
-      </p:sp>
-      <p:sp>
-        <p:nvSpPr>
-          <p:cNvPr id="11" name="Slide Number Placeholder 10"/>
+          <p:cNvPr id="5" name="Slide Number Placeholder 4"/>
           <p:cNvSpPr>
             <a:spLocks noGrp="1"/>
           </p:cNvSpPr>
@@ -9671,142 +9563,9 @@
               <a:rPr lang="de-CH" smtClean="0"/>
               <a:t>Slide </a:t>
             </a:r>
-            <a:fld id="{3F1993F0-36F9-4099-8132-DA7E4BD2FD25}" type="slidenum">
+            <a:fld id="{E37D6AFA-B3CB-49D5-91CD-D5AB386F431E}" type="slidenum">
               <a:rPr lang="de-CH" smtClean="0"/>
               <a:t>21</a:t>
-            </a:fld>
-            <a:endParaRPr lang="de-CH" dirty="0"/>
-          </a:p>
-        </p:txBody>
-      </p:sp>
-    </p:spTree>
-    <p:extLst>
-      <p:ext uri="{BB962C8B-B14F-4D97-AF65-F5344CB8AC3E}">
-        <p14:creationId xmlns:p14="http://schemas.microsoft.com/office/powerpoint/2010/main" val="248274490"/>
-      </p:ext>
-    </p:extLst>
-  </p:cSld>
-  <p:clrMapOvr>
-    <a:masterClrMapping/>
-  </p:clrMapOvr>
-  <p:timing>
-    <p:tnLst>
-      <p:par>
-        <p:cTn id="1" dur="indefinite" restart="never" nodeType="tmRoot"/>
-      </p:par>
-    </p:tnLst>
-  </p:timing>
-</p:sld>
-</file>
-
-<file path=ppt/slides/slide22.xml><?xml version="1.0" encoding="utf-8"?>
-<p:sld xmlns:a="http://schemas.openxmlformats.org/drawingml/2006/main" xmlns:r="http://schemas.openxmlformats.org/officeDocument/2006/relationships" xmlns:p="http://schemas.openxmlformats.org/presentationml/2006/main">
-  <p:cSld>
-    <p:spTree>
-      <p:nvGrpSpPr>
-        <p:cNvPr id="1" name=""/>
-        <p:cNvGrpSpPr/>
-        <p:nvPr/>
-      </p:nvGrpSpPr>
-      <p:grpSpPr>
-        <a:xfrm>
-          <a:off x="0" y="0"/>
-          <a:ext cx="0" cy="0"/>
-          <a:chOff x="0" y="0"/>
-          <a:chExt cx="0" cy="0"/>
-        </a:xfrm>
-      </p:grpSpPr>
-      <p:sp>
-        <p:nvSpPr>
-          <p:cNvPr id="2" name="Title 1"/>
-          <p:cNvSpPr>
-            <a:spLocks noGrp="1"/>
-          </p:cNvSpPr>
-          <p:nvPr>
-            <p:ph type="ctrTitle"/>
-          </p:nvPr>
-        </p:nvSpPr>
-        <p:spPr/>
-        <p:txBody>
-          <a:bodyPr/>
-          <a:lstStyle/>
-          <a:p>
-            <a:r>
-              <a:rPr lang="en-GB" dirty="0" smtClean="0"/>
-              <a:t>TDD Example</a:t>
-            </a:r>
-            <a:endParaRPr lang="en-GB" dirty="0"/>
-          </a:p>
-        </p:txBody>
-      </p:sp>
-      <p:sp>
-        <p:nvSpPr>
-          <p:cNvPr id="3" name="Subtitle 2"/>
-          <p:cNvSpPr>
-            <a:spLocks noGrp="1"/>
-          </p:cNvSpPr>
-          <p:nvPr>
-            <p:ph type="subTitle" idx="1"/>
-          </p:nvPr>
-        </p:nvSpPr>
-        <p:spPr/>
-        <p:txBody>
-          <a:bodyPr/>
-          <a:lstStyle/>
-          <a:p>
-            <a:r>
-              <a:rPr lang="en-GB" dirty="0" smtClean="0"/>
-              <a:t>Showcase</a:t>
-            </a:r>
-            <a:endParaRPr lang="en-GB" dirty="0"/>
-          </a:p>
-        </p:txBody>
-      </p:sp>
-      <p:sp>
-        <p:nvSpPr>
-          <p:cNvPr id="7" name="Date Placeholder 6"/>
-          <p:cNvSpPr>
-            <a:spLocks noGrp="1"/>
-          </p:cNvSpPr>
-          <p:nvPr>
-            <p:ph type="dt" sz="half" idx="10"/>
-          </p:nvPr>
-        </p:nvSpPr>
-        <p:spPr/>
-        <p:txBody>
-          <a:bodyPr/>
-          <a:lstStyle/>
-          <a:p>
-            <a:r>
-              <a:rPr lang="de-CH" smtClean="0"/>
-              <a:t>3. March 2014</a:t>
-            </a:r>
-            <a:endParaRPr lang="de-CH" dirty="0"/>
-          </a:p>
-        </p:txBody>
-      </p:sp>
-      <p:sp>
-        <p:nvSpPr>
-          <p:cNvPr id="5" name="Slide Number Placeholder 4"/>
-          <p:cNvSpPr>
-            <a:spLocks noGrp="1"/>
-          </p:cNvSpPr>
-          <p:nvPr>
-            <p:ph type="sldNum" sz="quarter" idx="12"/>
-          </p:nvPr>
-        </p:nvSpPr>
-        <p:spPr/>
-        <p:txBody>
-          <a:bodyPr/>
-          <a:lstStyle/>
-          <a:p>
-            <a:r>
-              <a:rPr lang="de-CH" smtClean="0"/>
-              <a:t>Slide </a:t>
-            </a:r>
-            <a:fld id="{E37D6AFA-B3CB-49D5-91CD-D5AB386F431E}" type="slidenum">
-              <a:rPr lang="de-CH" smtClean="0"/>
-              <a:t>22</a:t>
             </a:fld>
             <a:endParaRPr lang="de-CH" dirty="0"/>
           </a:p>

</xml_diff>